<commit_message>
Atualização do diagrama de componentes
</commit_message>
<xml_diff>
--- a/docs/Diagrama.pptx
+++ b/docs/Diagrama.pptx
@@ -115,13 +115,101 @@
 <file path=ppt/revisionInfo.xml><?xml version="1.0" encoding="utf-8"?>
 <p1510:revInfo xmlns:a="http://schemas.openxmlformats.org/drawingml/2006/main" xmlns:r="http://schemas.openxmlformats.org/officeDocument/2006/relationships" xmlns:p1510="http://schemas.microsoft.com/office/powerpoint/2015/10/main">
   <p1510:revLst>
-    <p1510:client id="{AF0E62AF-2392-408C-BF01-670E29C179C3}" v="2" dt="2022-10-08T03:09:41.151"/>
+    <p1510:client id="{4C75B9C1-FBDB-49B8-82B5-3CDEEE50A0AC}" v="1" dt="2022-11-20T18:33:04.425"/>
   </p1510:revLst>
 </p1510:revInfo>
 </file>
 
 <file path=ppt/changesInfos/changesInfo1.xml><?xml version="1.0" encoding="utf-8"?>
 <pc:chgInfo xmlns:a="http://schemas.openxmlformats.org/drawingml/2006/main" xmlns:r="http://schemas.openxmlformats.org/officeDocument/2006/relationships" xmlns:ac="http://schemas.microsoft.com/office/drawing/2013/main/command" xmlns:pc="http://schemas.microsoft.com/office/powerpoint/2013/main/command">
+  <pc:docChgLst>
+    <pc:chgData name="Flavio Martins Da Cruz" userId="7dbe8e30-2e97-43ef-8040-520ddcc14afe" providerId="ADAL" clId="{4C75B9C1-FBDB-49B8-82B5-3CDEEE50A0AC}"/>
+    <pc:docChg chg="custSel modSld">
+      <pc:chgData name="Flavio Martins Da Cruz" userId="7dbe8e30-2e97-43ef-8040-520ddcc14afe" providerId="ADAL" clId="{4C75B9C1-FBDB-49B8-82B5-3CDEEE50A0AC}" dt="2022-11-20T18:33:08.827" v="4" actId="1076"/>
+      <pc:docMkLst>
+        <pc:docMk/>
+      </pc:docMkLst>
+      <pc:sldChg chg="addSp delSp modSp mod">
+        <pc:chgData name="Flavio Martins Da Cruz" userId="7dbe8e30-2e97-43ef-8040-520ddcc14afe" providerId="ADAL" clId="{4C75B9C1-FBDB-49B8-82B5-3CDEEE50A0AC}" dt="2022-11-20T18:33:08.827" v="4" actId="1076"/>
+        <pc:sldMkLst>
+          <pc:docMk/>
+          <pc:sldMk cId="3119939603" sldId="256"/>
+        </pc:sldMkLst>
+        <pc:spChg chg="mod">
+          <ac:chgData name="Flavio Martins Da Cruz" userId="7dbe8e30-2e97-43ef-8040-520ddcc14afe" providerId="ADAL" clId="{4C75B9C1-FBDB-49B8-82B5-3CDEEE50A0AC}" dt="2022-11-20T18:33:00.948" v="1" actId="1076"/>
+          <ac:spMkLst>
+            <pc:docMk/>
+            <pc:sldMk cId="3119939603" sldId="256"/>
+            <ac:spMk id="20" creationId="{96E52030-C282-D0E0-A00F-58E1E3CB9DE8}"/>
+          </ac:spMkLst>
+        </pc:spChg>
+        <pc:spChg chg="del">
+          <ac:chgData name="Flavio Martins Da Cruz" userId="7dbe8e30-2e97-43ef-8040-520ddcc14afe" providerId="ADAL" clId="{4C75B9C1-FBDB-49B8-82B5-3CDEEE50A0AC}" dt="2022-11-20T18:32:53.305" v="0" actId="478"/>
+          <ac:spMkLst>
+            <pc:docMk/>
+            <pc:sldMk cId="3119939603" sldId="256"/>
+            <ac:spMk id="22" creationId="{84CC86C7-FE42-74D2-0C27-04EC32B0D8C6}"/>
+          </ac:spMkLst>
+        </pc:spChg>
+        <pc:picChg chg="mod">
+          <ac:chgData name="Flavio Martins Da Cruz" userId="7dbe8e30-2e97-43ef-8040-520ddcc14afe" providerId="ADAL" clId="{4C75B9C1-FBDB-49B8-82B5-3CDEEE50A0AC}" dt="2022-11-20T18:33:00.948" v="1" actId="1076"/>
+          <ac:picMkLst>
+            <pc:docMk/>
+            <pc:sldMk cId="3119939603" sldId="256"/>
+            <ac:picMk id="3" creationId="{D64BA424-1DD1-D60C-3D98-E12C46FA0AF4}"/>
+          </ac:picMkLst>
+        </pc:picChg>
+        <pc:picChg chg="del">
+          <ac:chgData name="Flavio Martins Da Cruz" userId="7dbe8e30-2e97-43ef-8040-520ddcc14afe" providerId="ADAL" clId="{4C75B9C1-FBDB-49B8-82B5-3CDEEE50A0AC}" dt="2022-11-20T18:32:53.305" v="0" actId="478"/>
+          <ac:picMkLst>
+            <pc:docMk/>
+            <pc:sldMk cId="3119939603" sldId="256"/>
+            <ac:picMk id="11" creationId="{CAFEF5CF-AE6E-D18F-9B3B-8105C5E98C2D}"/>
+          </ac:picMkLst>
+        </pc:picChg>
+        <pc:picChg chg="del">
+          <ac:chgData name="Flavio Martins Da Cruz" userId="7dbe8e30-2e97-43ef-8040-520ddcc14afe" providerId="ADAL" clId="{4C75B9C1-FBDB-49B8-82B5-3CDEEE50A0AC}" dt="2022-11-20T18:32:53.305" v="0" actId="478"/>
+          <ac:picMkLst>
+            <pc:docMk/>
+            <pc:sldMk cId="3119939603" sldId="256"/>
+            <ac:picMk id="19" creationId="{5DDF804A-04EB-0456-0D62-3F736FF4865C}"/>
+          </ac:picMkLst>
+        </pc:picChg>
+        <pc:picChg chg="mod">
+          <ac:chgData name="Flavio Martins Da Cruz" userId="7dbe8e30-2e97-43ef-8040-520ddcc14afe" providerId="ADAL" clId="{4C75B9C1-FBDB-49B8-82B5-3CDEEE50A0AC}" dt="2022-11-20T18:33:00.948" v="1" actId="1076"/>
+          <ac:picMkLst>
+            <pc:docMk/>
+            <pc:sldMk cId="3119939603" sldId="256"/>
+            <ac:picMk id="23" creationId="{55C3CD59-46EE-7F44-E0A8-342D8D1BEF69}"/>
+          </ac:picMkLst>
+        </pc:picChg>
+        <pc:cxnChg chg="add mod">
+          <ac:chgData name="Flavio Martins Da Cruz" userId="7dbe8e30-2e97-43ef-8040-520ddcc14afe" providerId="ADAL" clId="{4C75B9C1-FBDB-49B8-82B5-3CDEEE50A0AC}" dt="2022-11-20T18:33:08.827" v="4" actId="1076"/>
+          <ac:cxnSpMkLst>
+            <pc:docMk/>
+            <pc:sldMk cId="3119939603" sldId="256"/>
+            <ac:cxnSpMk id="2" creationId="{6B638DA8-7EA3-DA7E-1526-374FB697AC8C}"/>
+          </ac:cxnSpMkLst>
+        </pc:cxnChg>
+        <pc:cxnChg chg="del">
+          <ac:chgData name="Flavio Martins Da Cruz" userId="7dbe8e30-2e97-43ef-8040-520ddcc14afe" providerId="ADAL" clId="{4C75B9C1-FBDB-49B8-82B5-3CDEEE50A0AC}" dt="2022-11-20T18:33:02.246" v="2" actId="478"/>
+          <ac:cxnSpMkLst>
+            <pc:docMk/>
+            <pc:sldMk cId="3119939603" sldId="256"/>
+            <ac:cxnSpMk id="26" creationId="{511F848B-228D-9CC9-1B98-AB0FF3D48984}"/>
+          </ac:cxnSpMkLst>
+        </pc:cxnChg>
+        <pc:cxnChg chg="del">
+          <ac:chgData name="Flavio Martins Da Cruz" userId="7dbe8e30-2e97-43ef-8040-520ddcc14afe" providerId="ADAL" clId="{4C75B9C1-FBDB-49B8-82B5-3CDEEE50A0AC}" dt="2022-11-20T18:32:53.305" v="0" actId="478"/>
+          <ac:cxnSpMkLst>
+            <pc:docMk/>
+            <pc:sldMk cId="3119939603" sldId="256"/>
+            <ac:cxnSpMk id="29" creationId="{D599A4B5-A751-B3EF-BF8B-F34C74039A03}"/>
+          </ac:cxnSpMkLst>
+        </pc:cxnChg>
+      </pc:sldChg>
+    </pc:docChg>
+  </pc:docChgLst>
   <pc:docChgLst>
     <pc:chgData name="Flavio Martins Da Cruz" userId="7dbe8e30-2e97-43ef-8040-520ddcc14afe" providerId="ADAL" clId="{AF0E62AF-2392-408C-BF01-670E29C179C3}"/>
     <pc:docChg chg="undo custSel modSld">
@@ -304,7 +392,7 @@
           <a:p>
             <a:fld id="{F300D274-181D-46A9-8EA5-162344BEDFD8}" type="datetimeFigureOut">
               <a:rPr lang="pt-BR" smtClean="0"/>
-              <a:t>08/10/2022</a:t>
+              <a:t>20/11/2022</a:t>
             </a:fld>
             <a:endParaRPr lang="pt-BR"/>
           </a:p>
@@ -502,7 +590,7 @@
           <a:p>
             <a:fld id="{F300D274-181D-46A9-8EA5-162344BEDFD8}" type="datetimeFigureOut">
               <a:rPr lang="pt-BR" smtClean="0"/>
-              <a:t>08/10/2022</a:t>
+              <a:t>20/11/2022</a:t>
             </a:fld>
             <a:endParaRPr lang="pt-BR"/>
           </a:p>
@@ -710,7 +798,7 @@
           <a:p>
             <a:fld id="{F300D274-181D-46A9-8EA5-162344BEDFD8}" type="datetimeFigureOut">
               <a:rPr lang="pt-BR" smtClean="0"/>
-              <a:t>08/10/2022</a:t>
+              <a:t>20/11/2022</a:t>
             </a:fld>
             <a:endParaRPr lang="pt-BR"/>
           </a:p>
@@ -908,7 +996,7 @@
           <a:p>
             <a:fld id="{F300D274-181D-46A9-8EA5-162344BEDFD8}" type="datetimeFigureOut">
               <a:rPr lang="pt-BR" smtClean="0"/>
-              <a:t>08/10/2022</a:t>
+              <a:t>20/11/2022</a:t>
             </a:fld>
             <a:endParaRPr lang="pt-BR"/>
           </a:p>
@@ -1183,7 +1271,7 @@
           <a:p>
             <a:fld id="{F300D274-181D-46A9-8EA5-162344BEDFD8}" type="datetimeFigureOut">
               <a:rPr lang="pt-BR" smtClean="0"/>
-              <a:t>08/10/2022</a:t>
+              <a:t>20/11/2022</a:t>
             </a:fld>
             <a:endParaRPr lang="pt-BR"/>
           </a:p>
@@ -1448,7 +1536,7 @@
           <a:p>
             <a:fld id="{F300D274-181D-46A9-8EA5-162344BEDFD8}" type="datetimeFigureOut">
               <a:rPr lang="pt-BR" smtClean="0"/>
-              <a:t>08/10/2022</a:t>
+              <a:t>20/11/2022</a:t>
             </a:fld>
             <a:endParaRPr lang="pt-BR"/>
           </a:p>
@@ -1860,7 +1948,7 @@
           <a:p>
             <a:fld id="{F300D274-181D-46A9-8EA5-162344BEDFD8}" type="datetimeFigureOut">
               <a:rPr lang="pt-BR" smtClean="0"/>
-              <a:t>08/10/2022</a:t>
+              <a:t>20/11/2022</a:t>
             </a:fld>
             <a:endParaRPr lang="pt-BR"/>
           </a:p>
@@ -2001,7 +2089,7 @@
           <a:p>
             <a:fld id="{F300D274-181D-46A9-8EA5-162344BEDFD8}" type="datetimeFigureOut">
               <a:rPr lang="pt-BR" smtClean="0"/>
-              <a:t>08/10/2022</a:t>
+              <a:t>20/11/2022</a:t>
             </a:fld>
             <a:endParaRPr lang="pt-BR"/>
           </a:p>
@@ -2114,7 +2202,7 @@
           <a:p>
             <a:fld id="{F300D274-181D-46A9-8EA5-162344BEDFD8}" type="datetimeFigureOut">
               <a:rPr lang="pt-BR" smtClean="0"/>
-              <a:t>08/10/2022</a:t>
+              <a:t>20/11/2022</a:t>
             </a:fld>
             <a:endParaRPr lang="pt-BR"/>
           </a:p>
@@ -2425,7 +2513,7 @@
           <a:p>
             <a:fld id="{F300D274-181D-46A9-8EA5-162344BEDFD8}" type="datetimeFigureOut">
               <a:rPr lang="pt-BR" smtClean="0"/>
-              <a:t>08/10/2022</a:t>
+              <a:t>20/11/2022</a:t>
             </a:fld>
             <a:endParaRPr lang="pt-BR"/>
           </a:p>
@@ -2713,7 +2801,7 @@
           <a:p>
             <a:fld id="{F300D274-181D-46A9-8EA5-162344BEDFD8}" type="datetimeFigureOut">
               <a:rPr lang="pt-BR" smtClean="0"/>
-              <a:t>08/10/2022</a:t>
+              <a:t>20/11/2022</a:t>
             </a:fld>
             <a:endParaRPr lang="pt-BR"/>
           </a:p>
@@ -2954,7 +3042,7 @@
           <a:p>
             <a:fld id="{F300D274-181D-46A9-8EA5-162344BEDFD8}" type="datetimeFigureOut">
               <a:rPr lang="pt-BR" smtClean="0"/>
-              <a:t>08/10/2022</a:t>
+              <a:t>20/11/2022</a:t>
             </a:fld>
             <a:endParaRPr lang="pt-BR"/>
           </a:p>
@@ -3606,12 +3694,54 @@
           </a:p>
         </p:txBody>
       </p:sp>
+      <p:sp>
+        <p:nvSpPr>
+          <p:cNvPr id="20" name="CaixaDeTexto 19">
+            <a:extLst>
+              <a:ext uri="{FF2B5EF4-FFF2-40B4-BE49-F238E27FC236}">
+                <a16:creationId xmlns:a16="http://schemas.microsoft.com/office/drawing/2014/main" id="{96E52030-C282-D0E0-A00F-58E1E3CB9DE8}"/>
+              </a:ext>
+            </a:extLst>
+          </p:cNvPr>
+          <p:cNvSpPr txBox="1"/>
+          <p:nvPr/>
+        </p:nvSpPr>
+        <p:spPr>
+          <a:xfrm>
+            <a:off x="9357803" y="4126701"/>
+            <a:ext cx="1825179" cy="830997"/>
+          </a:xfrm>
+          <a:prstGeom prst="rect">
+            <a:avLst/>
+          </a:prstGeom>
+          <a:noFill/>
+        </p:spPr>
+        <p:txBody>
+          <a:bodyPr wrap="none" rtlCol="0">
+            <a:spAutoFit/>
+          </a:bodyPr>
+          <a:lstStyle/>
+          <a:p>
+            <a:r>
+              <a:rPr lang="pt-BR" sz="2400" dirty="0"/>
+              <a:t>Hospedagem</a:t>
+            </a:r>
+          </a:p>
+          <a:p>
+            <a:r>
+              <a:rPr lang="pt-BR" sz="2400"/>
+              <a:t>Github</a:t>
+            </a:r>
+            <a:endParaRPr lang="pt-BR" sz="2400" dirty="0"/>
+          </a:p>
+        </p:txBody>
+      </p:sp>
       <p:pic>
         <p:nvPicPr>
-          <p:cNvPr id="19" name="Imagem 18" descr="Ícone&#10;&#10;Descrição gerada automaticamente">
-            <a:extLst>
-              <a:ext uri="{FF2B5EF4-FFF2-40B4-BE49-F238E27FC236}">
-                <a16:creationId xmlns:a16="http://schemas.microsoft.com/office/drawing/2014/main" id="{5DDF804A-04EB-0456-0D62-3F736FF4865C}"/>
+          <p:cNvPr id="23" name="Imagem 22" descr="Ícone&#10;&#10;Descrição gerada automaticamente">
+            <a:extLst>
+              <a:ext uri="{FF2B5EF4-FFF2-40B4-BE49-F238E27FC236}">
+                <a16:creationId xmlns:a16="http://schemas.microsoft.com/office/drawing/2014/main" id="{55C3CD59-46EE-7F44-E0A8-342D8D1BEF69}"/>
               </a:ext>
             </a:extLst>
           </p:cNvPr>
@@ -3634,184 +3764,7 @@
         </p:blipFill>
         <p:spPr>
           <a:xfrm>
-            <a:off x="8936074" y="4002925"/>
-            <a:ext cx="1406235" cy="1728838"/>
-          </a:xfrm>
-          <a:prstGeom prst="rect">
-            <a:avLst/>
-          </a:prstGeom>
-        </p:spPr>
-      </p:pic>
-      <p:pic>
-        <p:nvPicPr>
-          <p:cNvPr id="11" name="Imagem 10" descr="Uma imagem contendo desenho&#10;&#10;Descrição gerada automaticamente">
-            <a:extLst>
-              <a:ext uri="{FF2B5EF4-FFF2-40B4-BE49-F238E27FC236}">
-                <a16:creationId xmlns:a16="http://schemas.microsoft.com/office/drawing/2014/main" id="{CAFEF5CF-AE6E-D18F-9B3B-8105C5E98C2D}"/>
-              </a:ext>
-            </a:extLst>
-          </p:cNvPr>
-          <p:cNvPicPr>
-            <a:picLocks noChangeAspect="1"/>
-          </p:cNvPicPr>
-          <p:nvPr/>
-        </p:nvPicPr>
-        <p:blipFill>
-          <a:blip r:embed="rId6">
-            <a:extLst>
-              <a:ext uri="{28A0092B-C50C-407E-A947-70E740481C1C}">
-                <a14:useLocalDpi xmlns:a14="http://schemas.microsoft.com/office/drawing/2010/main" val="0"/>
-              </a:ext>
-            </a:extLst>
-          </a:blip>
-          <a:stretch>
-            <a:fillRect/>
-          </a:stretch>
-        </p:blipFill>
-        <p:spPr>
-          <a:xfrm>
-            <a:off x="9456436" y="4713423"/>
-            <a:ext cx="906278" cy="906278"/>
-          </a:xfrm>
-          <a:prstGeom prst="rect">
-            <a:avLst/>
-          </a:prstGeom>
-          <a:ln>
-            <a:noFill/>
-          </a:ln>
-          <a:effectLst>
-            <a:outerShdw blurRad="63500" sx="112000" sy="112000" algn="ctr" rotWithShape="0">
-              <a:prstClr val="black">
-                <a:alpha val="40000"/>
-              </a:prstClr>
-            </a:outerShdw>
-          </a:effectLst>
-        </p:spPr>
-      </p:pic>
-      <p:sp>
-        <p:nvSpPr>
-          <p:cNvPr id="20" name="CaixaDeTexto 19">
-            <a:extLst>
-              <a:ext uri="{FF2B5EF4-FFF2-40B4-BE49-F238E27FC236}">
-                <a16:creationId xmlns:a16="http://schemas.microsoft.com/office/drawing/2014/main" id="{96E52030-C282-D0E0-A00F-58E1E3CB9DE8}"/>
-              </a:ext>
-            </a:extLst>
-          </p:cNvPr>
-          <p:cNvSpPr txBox="1"/>
-          <p:nvPr/>
-        </p:nvSpPr>
-        <p:spPr>
-          <a:xfrm>
-            <a:off x="8747006" y="2505962"/>
-            <a:ext cx="1825179" cy="830997"/>
-          </a:xfrm>
-          <a:prstGeom prst="rect">
-            <a:avLst/>
-          </a:prstGeom>
-          <a:noFill/>
-        </p:spPr>
-        <p:txBody>
-          <a:bodyPr wrap="none" rtlCol="0">
-            <a:spAutoFit/>
-          </a:bodyPr>
-          <a:lstStyle/>
-          <a:p>
-            <a:r>
-              <a:rPr lang="pt-BR" sz="2400" dirty="0"/>
-              <a:t>Hospedagem</a:t>
-            </a:r>
-          </a:p>
-          <a:p>
-            <a:r>
-              <a:rPr lang="pt-BR" sz="2400"/>
-              <a:t>Github</a:t>
-            </a:r>
-            <a:endParaRPr lang="pt-BR" sz="2400" dirty="0"/>
-          </a:p>
-        </p:txBody>
-      </p:sp>
-      <p:sp>
-        <p:nvSpPr>
-          <p:cNvPr id="22" name="CaixaDeTexto 21">
-            <a:extLst>
-              <a:ext uri="{FF2B5EF4-FFF2-40B4-BE49-F238E27FC236}">
-                <a16:creationId xmlns:a16="http://schemas.microsoft.com/office/drawing/2014/main" id="{84CC86C7-FE42-74D2-0C27-04EC32B0D8C6}"/>
-              </a:ext>
-            </a:extLst>
-          </p:cNvPr>
-          <p:cNvSpPr txBox="1"/>
-          <p:nvPr/>
-        </p:nvSpPr>
-        <p:spPr>
-          <a:xfrm>
-            <a:off x="8129483" y="5743351"/>
-            <a:ext cx="3019416" cy="830997"/>
-          </a:xfrm>
-          <a:prstGeom prst="rect">
-            <a:avLst/>
-          </a:prstGeom>
-          <a:noFill/>
-        </p:spPr>
-        <p:txBody>
-          <a:bodyPr wrap="none" rtlCol="0">
-            <a:spAutoFit/>
-          </a:bodyPr>
-          <a:lstStyle/>
-          <a:p>
-            <a:pPr algn="ctr"/>
-            <a:r>
-              <a:rPr lang="pt-BR" sz="2400" dirty="0"/>
-              <a:t>API v3</a:t>
-            </a:r>
-            <a:br>
-              <a:rPr lang="pt-BR" sz="2400" dirty="0"/>
-            </a:br>
-            <a:r>
-              <a:rPr lang="pt-BR" sz="2400" b="0" i="0" dirty="0">
-                <a:solidFill>
-                  <a:srgbClr val="D3D3D3"/>
-                </a:solidFill>
-                <a:effectLst/>
-                <a:latin typeface="Calibri" panose="020F0502020204030204" pitchFamily="34" charset="0"/>
-              </a:rPr>
-              <a:t> </a:t>
-            </a:r>
-            <a:r>
-              <a:rPr lang="pt-BR" sz="2400" dirty="0"/>
-              <a:t>haveibeenpwned.com</a:t>
-            </a:r>
-          </a:p>
-        </p:txBody>
-      </p:sp>
-      <p:pic>
-        <p:nvPicPr>
-          <p:cNvPr id="23" name="Imagem 22" descr="Ícone&#10;&#10;Descrição gerada automaticamente">
-            <a:extLst>
-              <a:ext uri="{FF2B5EF4-FFF2-40B4-BE49-F238E27FC236}">
-                <a16:creationId xmlns:a16="http://schemas.microsoft.com/office/drawing/2014/main" id="{55C3CD59-46EE-7F44-E0A8-342D8D1BEF69}"/>
-              </a:ext>
-            </a:extLst>
-          </p:cNvPr>
-          <p:cNvPicPr>
-            <a:picLocks noChangeAspect="1"/>
-          </p:cNvPicPr>
-          <p:nvPr/>
-        </p:nvPicPr>
-        <p:blipFill>
-          <a:blip r:embed="rId5">
-            <a:extLst>
-              <a:ext uri="{28A0092B-C50C-407E-A947-70E740481C1C}">
-                <a14:useLocalDpi xmlns:a14="http://schemas.microsoft.com/office/drawing/2010/main" val="0"/>
-              </a:ext>
-            </a:extLst>
-          </a:blip>
-          <a:stretch>
-            <a:fillRect/>
-          </a:stretch>
-        </p:blipFill>
-        <p:spPr>
-          <a:xfrm>
-            <a:off x="8956479" y="821655"/>
+            <a:off x="9567276" y="2442394"/>
             <a:ext cx="1406235" cy="1728838"/>
           </a:xfrm>
           <a:prstGeom prst="rect">
@@ -3864,24 +3817,63 @@
           </a:fontRef>
         </p:style>
       </p:cxnSp>
+      <p:pic>
+        <p:nvPicPr>
+          <p:cNvPr id="3" name="Imagem 2">
+            <a:extLst>
+              <a:ext uri="{FF2B5EF4-FFF2-40B4-BE49-F238E27FC236}">
+                <a16:creationId xmlns:a16="http://schemas.microsoft.com/office/drawing/2014/main" id="{D64BA424-1DD1-D60C-3D98-E12C46FA0AF4}"/>
+              </a:ext>
+            </a:extLst>
+          </p:cNvPr>
+          <p:cNvPicPr>
+            <a:picLocks noChangeAspect="1"/>
+          </p:cNvPicPr>
+          <p:nvPr/>
+        </p:nvPicPr>
+        <p:blipFill>
+          <a:blip r:embed="rId6">
+            <a:extLst>
+              <a:ext uri="{28A0092B-C50C-407E-A947-70E740481C1C}">
+                <a14:useLocalDpi xmlns:a14="http://schemas.microsoft.com/office/drawing/2010/main" val="0"/>
+              </a:ext>
+            </a:extLst>
+          </a:blip>
+          <a:stretch>
+            <a:fillRect/>
+          </a:stretch>
+        </p:blipFill>
+        <p:spPr>
+          <a:xfrm>
+            <a:off x="10385349" y="4553878"/>
+            <a:ext cx="327195" cy="327195"/>
+          </a:xfrm>
+          <a:prstGeom prst="rect">
+            <a:avLst/>
+          </a:prstGeom>
+          <a:effectLst>
+            <a:outerShdw sx="1000" sy="1000" algn="ctr" rotWithShape="0">
+              <a:schemeClr val="bg1"/>
+            </a:outerShdw>
+          </a:effectLst>
+        </p:spPr>
+      </p:pic>
       <p:cxnSp>
         <p:nvCxnSpPr>
-          <p:cNvPr id="26" name="Conector de Seta Reta 25">
-            <a:extLst>
-              <a:ext uri="{FF2B5EF4-FFF2-40B4-BE49-F238E27FC236}">
-                <a16:creationId xmlns:a16="http://schemas.microsoft.com/office/drawing/2014/main" id="{511F848B-228D-9CC9-1B98-AB0FF3D48984}"/>
-              </a:ext>
-            </a:extLst>
-          </p:cNvPr>
-          <p:cNvCxnSpPr>
-            <a:cxnSpLocks/>
-          </p:cNvCxnSpPr>
+          <p:cNvPr id="2" name="Conector de Seta Reta 1">
+            <a:extLst>
+              <a:ext uri="{FF2B5EF4-FFF2-40B4-BE49-F238E27FC236}">
+                <a16:creationId xmlns:a16="http://schemas.microsoft.com/office/drawing/2014/main" id="{6B638DA8-7EA3-DA7E-1526-374FB697AC8C}"/>
+              </a:ext>
+            </a:extLst>
+          </p:cNvPr>
+          <p:cNvCxnSpPr/>
           <p:nvPr/>
         </p:nvCxnSpPr>
         <p:spPr>
-          <a:xfrm flipV="1">
-            <a:off x="7338336" y="2114224"/>
-            <a:ext cx="1175426" cy="783476"/>
+          <a:xfrm>
+            <a:off x="7762875" y="3600698"/>
+            <a:ext cx="1352550" cy="0"/>
           </a:xfrm>
           <a:prstGeom prst="straightConnector1">
             <a:avLst/>
@@ -3911,94 +3903,6 @@
           </a:fontRef>
         </p:style>
       </p:cxnSp>
-      <p:cxnSp>
-        <p:nvCxnSpPr>
-          <p:cNvPr id="29" name="Conector de Seta Reta 28">
-            <a:extLst>
-              <a:ext uri="{FF2B5EF4-FFF2-40B4-BE49-F238E27FC236}">
-                <a16:creationId xmlns:a16="http://schemas.microsoft.com/office/drawing/2014/main" id="{D599A4B5-A751-B3EF-BF8B-F34C74039A03}"/>
-              </a:ext>
-            </a:extLst>
-          </p:cNvPr>
-          <p:cNvCxnSpPr>
-            <a:cxnSpLocks/>
-          </p:cNvCxnSpPr>
-          <p:nvPr/>
-        </p:nvCxnSpPr>
-        <p:spPr>
-          <a:xfrm>
-            <a:off x="7541770" y="4238830"/>
-            <a:ext cx="1175426" cy="783476"/>
-          </a:xfrm>
-          <a:prstGeom prst="straightConnector1">
-            <a:avLst/>
-          </a:prstGeom>
-          <a:ln w="57150">
-            <a:solidFill>
-              <a:schemeClr val="tx1">
-                <a:lumMod val="85000"/>
-                <a:lumOff val="15000"/>
-              </a:schemeClr>
-            </a:solidFill>
-            <a:tailEnd type="triangle"/>
-          </a:ln>
-        </p:spPr>
-        <p:style>
-          <a:lnRef idx="1">
-            <a:schemeClr val="accent1"/>
-          </a:lnRef>
-          <a:fillRef idx="0">
-            <a:schemeClr val="accent1"/>
-          </a:fillRef>
-          <a:effectRef idx="0">
-            <a:schemeClr val="accent1"/>
-          </a:effectRef>
-          <a:fontRef idx="minor">
-            <a:schemeClr val="tx1"/>
-          </a:fontRef>
-        </p:style>
-      </p:cxnSp>
-      <p:pic>
-        <p:nvPicPr>
-          <p:cNvPr id="3" name="Imagem 2">
-            <a:extLst>
-              <a:ext uri="{FF2B5EF4-FFF2-40B4-BE49-F238E27FC236}">
-                <a16:creationId xmlns:a16="http://schemas.microsoft.com/office/drawing/2014/main" id="{D64BA424-1DD1-D60C-3D98-E12C46FA0AF4}"/>
-              </a:ext>
-            </a:extLst>
-          </p:cNvPr>
-          <p:cNvPicPr>
-            <a:picLocks noChangeAspect="1"/>
-          </p:cNvPicPr>
-          <p:nvPr/>
-        </p:nvPicPr>
-        <p:blipFill>
-          <a:blip r:embed="rId7">
-            <a:extLst>
-              <a:ext uri="{28A0092B-C50C-407E-A947-70E740481C1C}">
-                <a14:useLocalDpi xmlns:a14="http://schemas.microsoft.com/office/drawing/2010/main" val="0"/>
-              </a:ext>
-            </a:extLst>
-          </a:blip>
-          <a:stretch>
-            <a:fillRect/>
-          </a:stretch>
-        </p:blipFill>
-        <p:spPr>
-          <a:xfrm>
-            <a:off x="9774552" y="2933139"/>
-            <a:ext cx="327195" cy="327195"/>
-          </a:xfrm>
-          <a:prstGeom prst="rect">
-            <a:avLst/>
-          </a:prstGeom>
-          <a:effectLst>
-            <a:outerShdw sx="1000" sy="1000" algn="ctr" rotWithShape="0">
-              <a:schemeClr val="bg1"/>
-            </a:outerShdw>
-          </a:effectLst>
-        </p:spPr>
-      </p:pic>
     </p:spTree>
     <p:extLst>
       <p:ext uri="{BB962C8B-B14F-4D97-AF65-F5344CB8AC3E}">

</xml_diff>